<commit_message>
update slides thema 4
</commit_message>
<xml_diff>
--- a/Skript-Folien/QM1-Thema04.pptx
+++ b/Skript-Folien/QM1-Thema04.pptx
@@ -18979,7 +18979,7 @@
               <a:buChar char="‣"/>
             </a:pPr>
             <a:r>
-              <a:t>„2. Quartil!“ bei Person 50, (50% kleiner, Größe 1.65m)</a:t>
+              <a:t>„2. Quartil!“ bei Person 50, (50% kleiner, Größe 1.80m)</a:t>
             </a:r>
           </a:p>
           <a:p>
@@ -18994,8 +18994,14 @@
               <a:buChar char="‣"/>
             </a:pPr>
             <a:r>
-              <a:t>„1. Quartil!“ bei Person 25, (25% kleiner, Größe 1.65m)</a:t>
-            </a:r>
+              <a:t>„3. Quartil!“ bei Person 75, (75% kleiner, Größe 1.95m)</a:t>
+            </a:r>
+          </a:p>
+          <a:p>
+            <a:pPr indent="0">
+              <a:buClrTx/>
+              <a:buFontTx/>
+            </a:pPr>
           </a:p>
           <a:p>
             <a:pPr marL="317500" indent="-317500">
@@ -19009,9 +19015,15 @@
               <a:buChar char="‣"/>
             </a:pPr>
             <a:r>
-              <a:t>„1. Quartil!“ bei Person 25, (25% kleiner, Größe 1.65m)</a:t>
-            </a:r>
-            <a:br/>
+              <a:t>Das </a:t>
+            </a:r>
+            <a:r>
+              <a:rPr i="1"/>
+              <a:t>1. Quartil</a:t>
+            </a:r>
+            <a:r>
+              <a:t> kennzeichnet denjenigen Wert der Körpergröße der Studentis, für den gilt, dass ein Viertel der Studentis kleiner (und drei Viertel größer sind).</a:t>
+            </a:r>
           </a:p>
           <a:p>
             <a:pPr marL="317500" indent="-317500">
@@ -19024,9 +19036,6 @@
               <a:buFontTx/>
               <a:buChar char="‣"/>
             </a:pPr>
-            <a:r>
-              <a:t>Das 1. Quartil kennzeichnet denjenigen Wert der Körpergröße der Studentis, für den gilt, dass ein Viertel der Studentis kleiner (und drei Viertel größer sind).</a:t>
-            </a:r>
           </a:p>
           <a:p>
             <a:pPr marL="317500" indent="-317500">
@@ -19039,18 +19048,6 @@
               <a:buFontTx/>
               <a:buChar char="‣"/>
             </a:pPr>
-          </a:p>
-          <a:p>
-            <a:pPr marL="317500" indent="-317500">
-              <a:buClr>
-                <a:schemeClr val="accent5">
-                  <a:lumOff val="-7647"/>
-                </a:schemeClr>
-              </a:buClr>
-              <a:buSzPct val="200000"/>
-              <a:buFontTx/>
-              <a:buChar char="‣"/>
-            </a:pPr>
             <a:r>
               <a:t>Ein Quartil … </a:t>
             </a:r>
@@ -19067,8 +19064,13 @@
               <a:buChar char="‣"/>
             </a:pPr>
             <a:r>
-              <a:t>ist eine bestimmte Art von Quantil</a:t>
-            </a:r>
+              <a:t>ist eine</a:t>
+            </a:r>
+            <a:r>
+              <a:rPr i="1"/>
+              <a:t> bestimmte Art von Quantil</a:t>
+            </a:r>
+            <a:endParaRPr i="1"/>
           </a:p>
           <a:p>
             <a:pPr lvl="1" marL="581526" indent="-200526">
@@ -19082,7 +19084,11 @@
               <a:buChar char="‣"/>
             </a:pPr>
             <a:r>
-              <a:t>verallgemeinert den Median, da der Median dem 2. Quartil entspricht</a:t>
+              <a:rPr i="1"/>
+              <a:t>verallgemeinert den Median</a:t>
+            </a:r>
+            <a:r>
+              <a:t>, da der Median dem 2. Quartil entspricht</a:t>
             </a:r>
           </a:p>
           <a:p>
@@ -19360,7 +19366,14 @@
               <a:buChar char="‣"/>
             </a:pPr>
             <a:r>
-              <a:t>Gängige Quantile sind</a:t>
+              <a:t>Gängige </a:t>
+            </a:r>
+            <a:r>
+              <a:rPr i="1"/>
+              <a:t>Quantile</a:t>
+            </a:r>
+            <a:r>
+              <a:t> sind</a:t>
             </a:r>
           </a:p>
           <a:p>
@@ -19375,7 +19388,11 @@
               <a:buChar char="‣"/>
             </a:pPr>
             <a:r>
-              <a:t>Quartile (Viertel)</a:t>
+              <a:rPr i="1"/>
+              <a:t>Quartile</a:t>
+            </a:r>
+            <a:r>
+              <a:t> (Viertel)</a:t>
             </a:r>
           </a:p>
           <a:p>
@@ -19390,7 +19407,11 @@
               <a:buChar char="‣"/>
             </a:pPr>
             <a:r>
-              <a:t>Quantile (Fünftel)</a:t>
+              <a:rPr i="1"/>
+              <a:t>Quintile</a:t>
+            </a:r>
+            <a:r>
+              <a:t> (Fünftel)</a:t>
             </a:r>
           </a:p>
           <a:p>
@@ -19405,7 +19426,11 @@
               <a:buChar char="‣"/>
             </a:pPr>
             <a:r>
-              <a:t>Dezile (Zehntel)</a:t>
+              <a:rPr i="1"/>
+              <a:t>Dezile</a:t>
+            </a:r>
+            <a:r>
+              <a:t> (Zehntel)</a:t>
             </a:r>
           </a:p>
           <a:p>
@@ -19420,7 +19445,11 @@
               <a:buChar char="‣"/>
             </a:pPr>
             <a:r>
-              <a:t>Perzentile (Hundertstel)</a:t>
+              <a:rPr i="1"/>
+              <a:t>Perzentile</a:t>
+            </a:r>
+            <a:r>
+              <a:t> (Hundertstel)</a:t>
             </a:r>
           </a:p>
           <a:p>
@@ -19435,7 +19464,14 @@
               <a:buChar char="‣"/>
             </a:pPr>
             <a:r>
-              <a:t>Ein Quantil ist also ein Oberbegriff für die Aufteilung einer Verteilung in eine bestimmte Anzahl an Bereichen gleicher Größe.</a:t>
+              <a:t>Ein Quantil ist also ein </a:t>
+            </a:r>
+            <a:r>
+              <a:rPr i="1"/>
+              <a:t>Oberbegriff</a:t>
+            </a:r>
+            <a:r>
+              <a:t> für die Aufteilung einer Verteilung in eine bestimmte Anzahl an Bereichen gleicher Größe.</a:t>
             </a:r>
           </a:p>
           <a:p>

</xml_diff>